<commit_message>
review Tran Kim Trung week1
</commit_message>
<xml_diff>
--- a/doc/Dùng Flask để xây dựng webTuan2.pptx
+++ b/doc/Dùng Flask để xây dựng webTuan2.pptx
@@ -8,10 +8,11 @@
     <p:sldId id="256" r:id="rId2"/>
     <p:sldId id="258" r:id="rId3"/>
     <p:sldId id="259" r:id="rId4"/>
-    <p:sldId id="261" r:id="rId5"/>
-    <p:sldId id="260" r:id="rId6"/>
-    <p:sldId id="262" r:id="rId7"/>
-    <p:sldId id="263" r:id="rId8"/>
+    <p:sldId id="264" r:id="rId5"/>
+    <p:sldId id="261" r:id="rId6"/>
+    <p:sldId id="260" r:id="rId7"/>
+    <p:sldId id="262" r:id="rId8"/>
+    <p:sldId id="263" r:id="rId9"/>
   </p:sldIdLst>
   <p:sldSz cx="12192000" cy="6858000"/>
   <p:notesSz cx="6858000" cy="9144000"/>
@@ -4763,40 +4764,12 @@
           <a:lstStyle/>
           <a:p>
             <a:r>
+              <a:rPr lang="en-US" altLang="ja-JP" dirty="0"/>
+              <a:t>Tran Kim </a:t>
+            </a:r>
+            <a:r>
               <a:rPr lang="en-US" altLang="ja-JP" dirty="0" err="1"/>
-              <a:t>Các</a:t>
-            </a:r>
-            <a:r>
-              <a:rPr lang="en-US" altLang="ja-JP" dirty="0"/>
-              <a:t> </a:t>
-            </a:r>
-            <a:r>
-              <a:rPr lang="en-US" altLang="ja-JP" dirty="0" err="1"/>
-              <a:t>công</a:t>
-            </a:r>
-            <a:r>
-              <a:rPr lang="en-US" altLang="ja-JP" dirty="0"/>
-              <a:t> </a:t>
-            </a:r>
-            <a:r>
-              <a:rPr lang="en-US" altLang="ja-JP" dirty="0" err="1"/>
-              <a:t>cụ</a:t>
-            </a:r>
-            <a:r>
-              <a:rPr lang="en-US" altLang="ja-JP" dirty="0"/>
-              <a:t> </a:t>
-            </a:r>
-            <a:r>
-              <a:rPr lang="en-US" altLang="ja-JP" dirty="0" err="1"/>
-              <a:t>tiện</a:t>
-            </a:r>
-            <a:r>
-              <a:rPr lang="en-US" altLang="ja-JP" dirty="0"/>
-              <a:t> </a:t>
-            </a:r>
-            <a:r>
-              <a:rPr lang="en-US" altLang="ja-JP" dirty="0" err="1"/>
-              <a:t>ích</a:t>
+              <a:t>Trung</a:t>
             </a:r>
             <a:endParaRPr kumimoji="1" lang="ja-JP" altLang="en-US" dirty="0"/>
           </a:p>
@@ -4818,84 +4791,89 @@
             <p:ph idx="1"/>
           </p:nvPr>
         </p:nvSpPr>
-        <p:spPr>
-          <a:xfrm>
-            <a:off x="838200" y="1875959"/>
-            <a:ext cx="10515600" cy="4351338"/>
-          </a:xfrm>
-        </p:spPr>
-        <p:txBody>
-          <a:bodyPr/>
-          <a:lstStyle/>
-          <a:p>
-            <a:r>
-              <a:rPr kumimoji="1" lang="en-US" altLang="ja-JP" dirty="0" err="1"/>
-              <a:t>Addin</a:t>
-            </a:r>
+        <p:spPr/>
+        <p:txBody>
+          <a:bodyPr/>
+          <a:lstStyle/>
+          <a:p>
             <a:r>
               <a:rPr kumimoji="1" lang="en-US" altLang="ja-JP" dirty="0"/>
-              <a:t> </a:t>
-            </a:r>
-            <a:r>
-              <a:rPr kumimoji="1" lang="en-US" altLang="ja-JP" dirty="0" err="1"/>
-              <a:t>dịch</a:t>
-            </a:r>
-            <a:r>
-              <a:rPr kumimoji="1" lang="en-US" altLang="ja-JP" dirty="0"/>
-              <a:t> </a:t>
-            </a:r>
-            <a:r>
-              <a:rPr kumimoji="1" lang="en-US" altLang="ja-JP" dirty="0" err="1"/>
-              <a:t>anh</a:t>
-            </a:r>
-            <a:r>
-              <a:rPr kumimoji="1" lang="en-US" altLang="ja-JP" dirty="0"/>
-              <a:t> </a:t>
-            </a:r>
-            <a:r>
-              <a:rPr kumimoji="1" lang="en-US" altLang="ja-JP" dirty="0" err="1"/>
-              <a:t>việt</a:t>
-            </a:r>
-            <a:r>
-              <a:rPr kumimoji="1" lang="en-US" altLang="ja-JP" dirty="0"/>
-              <a:t> </a:t>
-            </a:r>
-            <a:r>
-              <a:rPr kumimoji="1" lang="en-US" altLang="ja-JP" dirty="0" err="1"/>
-              <a:t>trên</a:t>
-            </a:r>
-            <a:r>
-              <a:rPr kumimoji="1" lang="en-US" altLang="ja-JP" dirty="0"/>
-              <a:t> chrome browser</a:t>
+              <a:t>HTML</a:t>
             </a:r>
           </a:p>
           <a:p>
             <a:pPr lvl="1"/>
             <a:r>
-              <a:rPr kumimoji="1" lang="en-US" altLang="ja-JP" dirty="0">
+              <a:rPr lang="en-US" altLang="ja-JP" dirty="0">
                 <a:hlinkClick r:id="rId2"/>
               </a:rPr>
-              <a:t>https://chrome.google.com/webstore/detail/d%E1%BB%8Bch-anh-vi%E1%BB%87t-translate-e/jejemeonlhibjibgehcmdlldoebijolf?hl=vi</a:t>
-            </a:r>
-            <a:endParaRPr kumimoji="1" lang="en-US" altLang="ja-JP" dirty="0"/>
+              <a:t>https://www.w3schools.com/</a:t>
+            </a:r>
+            <a:endParaRPr lang="en-US" altLang="ja-JP" dirty="0"/>
+          </a:p>
+          <a:p>
+            <a:r>
+              <a:rPr lang="en-US" altLang="ja-JP" dirty="0" err="1"/>
+              <a:t>Cách</a:t>
+            </a:r>
+            <a:r>
+              <a:rPr lang="en-US" altLang="ja-JP" dirty="0"/>
+              <a:t> </a:t>
+            </a:r>
+            <a:r>
+              <a:rPr lang="en-US" altLang="ja-JP" dirty="0" err="1"/>
+              <a:t>gửi</a:t>
+            </a:r>
+            <a:r>
+              <a:rPr lang="en-US" altLang="ja-JP" dirty="0"/>
+              <a:t> </a:t>
+            </a:r>
+            <a:r>
+              <a:rPr lang="en-US" altLang="ja-JP" dirty="0" err="1"/>
+              <a:t>dữ</a:t>
+            </a:r>
+            <a:r>
+              <a:rPr lang="en-US" altLang="ja-JP" dirty="0"/>
+              <a:t> </a:t>
+            </a:r>
+            <a:r>
+              <a:rPr lang="en-US" altLang="ja-JP" dirty="0" err="1"/>
+              <a:t>liệu</a:t>
+            </a:r>
+            <a:r>
+              <a:rPr lang="en-US" altLang="ja-JP" dirty="0"/>
+              <a:t> </a:t>
+            </a:r>
+            <a:r>
+              <a:rPr lang="en-US" altLang="ja-JP" dirty="0" err="1"/>
+              <a:t>từ</a:t>
+            </a:r>
+            <a:r>
+              <a:rPr lang="en-US" altLang="ja-JP" dirty="0"/>
+              <a:t> form -&gt; server</a:t>
+            </a:r>
           </a:p>
           <a:p>
             <a:pPr lvl="1"/>
             <a:r>
               <a:rPr lang="en-US" altLang="ja-JP" dirty="0"/>
-              <a:t>https://chrome.google.com/webstore/detail/select-to-translate-trans/hkbmajmmaeonfhjdcofabfilgfigpbao</a:t>
-            </a:r>
-          </a:p>
-          <a:p>
-            <a:pPr lvl="1"/>
-            <a:endParaRPr kumimoji="1" lang="ja-JP" altLang="en-US" dirty="0"/>
+              <a:t>How to get data from html form flask</a:t>
+            </a:r>
+          </a:p>
+          <a:p>
+            <a:pPr lvl="2"/>
+            <a:r>
+              <a:rPr lang="en-US" altLang="ja-JP"/>
+              <a:t>Youtube</a:t>
+            </a:r>
+            <a:endParaRPr lang="en-US" altLang="ja-JP" dirty="0"/>
           </a:p>
         </p:txBody>
       </p:sp>
     </p:spTree>
     <p:extLst>
       <p:ext uri="{BB962C8B-B14F-4D97-AF65-F5344CB8AC3E}">
-        <p14:creationId xmlns:p14="http://schemas.microsoft.com/office/powerpoint/2010/main" val="3730557784"/>
+        <p14:creationId xmlns:p14="http://schemas.microsoft.com/office/powerpoint/2010/main" val="719569255"/>
       </p:ext>
     </p:extLst>
   </p:cSld>
@@ -4945,7 +4923,7 @@
           <a:p>
             <a:r>
               <a:rPr lang="en-US" altLang="ja-JP" dirty="0" err="1"/>
-              <a:t>Bước</a:t>
+              <a:t>Các</a:t>
             </a:r>
             <a:r>
               <a:rPr lang="en-US" altLang="ja-JP" dirty="0"/>
@@ -4953,7 +4931,7 @@
             </a:r>
             <a:r>
               <a:rPr lang="en-US" altLang="ja-JP" dirty="0" err="1"/>
-              <a:t>tiếp</a:t>
+              <a:t>công</a:t>
             </a:r>
             <a:r>
               <a:rPr lang="en-US" altLang="ja-JP" dirty="0"/>
@@ -4961,7 +4939,23 @@
             </a:r>
             <a:r>
               <a:rPr lang="en-US" altLang="ja-JP" dirty="0" err="1"/>
-              <a:t>theo</a:t>
+              <a:t>cụ</a:t>
+            </a:r>
+            <a:r>
+              <a:rPr lang="en-US" altLang="ja-JP" dirty="0"/>
+              <a:t> </a:t>
+            </a:r>
+            <a:r>
+              <a:rPr lang="en-US" altLang="ja-JP" dirty="0" err="1"/>
+              <a:t>tiện</a:t>
+            </a:r>
+            <a:r>
+              <a:rPr lang="en-US" altLang="ja-JP" dirty="0"/>
+              <a:t> </a:t>
+            </a:r>
+            <a:r>
+              <a:rPr lang="en-US" altLang="ja-JP" dirty="0" err="1"/>
+              <a:t>ích</a:t>
             </a:r>
             <a:endParaRPr kumimoji="1" lang="ja-JP" altLang="en-US" dirty="0"/>
           </a:p>
@@ -4983,192 +4977,84 @@
             <p:ph idx="1"/>
           </p:nvPr>
         </p:nvSpPr>
-        <p:spPr/>
-        <p:txBody>
-          <a:bodyPr>
-            <a:normAutofit lnSpcReduction="10000"/>
-          </a:bodyPr>
+        <p:spPr>
+          <a:xfrm>
+            <a:off x="838200" y="1875959"/>
+            <a:ext cx="10515600" cy="4351338"/>
+          </a:xfrm>
+        </p:spPr>
+        <p:txBody>
+          <a:bodyPr/>
           <a:lstStyle/>
           <a:p>
             <a:r>
               <a:rPr kumimoji="1" lang="en-US" altLang="ja-JP" dirty="0" err="1"/>
-              <a:t>Tìm</a:t>
+              <a:t>Addin</a:t>
             </a:r>
             <a:r>
               <a:rPr kumimoji="1" lang="en-US" altLang="ja-JP" dirty="0"/>
               <a:t> </a:t>
             </a:r>
             <a:r>
-              <a:rPr lang="en-US" altLang="ja-JP" dirty="0" err="1"/>
-              <a:t>hiểu</a:t>
-            </a:r>
-            <a:r>
-              <a:rPr lang="en-US" altLang="ja-JP" dirty="0"/>
-              <a:t> </a:t>
-            </a:r>
-            <a:r>
-              <a:rPr lang="en-US" altLang="ja-JP" dirty="0" err="1"/>
-              <a:t>sâu</a:t>
-            </a:r>
-            <a:r>
-              <a:rPr lang="en-US" altLang="ja-JP" dirty="0"/>
-              <a:t> </a:t>
-            </a:r>
-            <a:r>
-              <a:rPr lang="en-US" altLang="ja-JP" dirty="0" err="1"/>
-              <a:t>thêm</a:t>
-            </a:r>
-            <a:r>
-              <a:rPr lang="en-US" altLang="ja-JP" dirty="0"/>
-              <a:t> </a:t>
-            </a:r>
-            <a:r>
-              <a:rPr lang="en-US" altLang="ja-JP" dirty="0" err="1"/>
-              <a:t>về</a:t>
-            </a:r>
-            <a:r>
-              <a:rPr lang="en-US" altLang="ja-JP" dirty="0"/>
-              <a:t> front end</a:t>
+              <a:rPr kumimoji="1" lang="en-US" altLang="ja-JP" dirty="0" err="1"/>
+              <a:t>dịch</a:t>
+            </a:r>
+            <a:r>
+              <a:rPr kumimoji="1" lang="en-US" altLang="ja-JP" dirty="0"/>
+              <a:t> </a:t>
+            </a:r>
+            <a:r>
+              <a:rPr kumimoji="1" lang="en-US" altLang="ja-JP" dirty="0" err="1"/>
+              <a:t>anh</a:t>
+            </a:r>
+            <a:r>
+              <a:rPr kumimoji="1" lang="en-US" altLang="ja-JP" dirty="0"/>
+              <a:t> </a:t>
+            </a:r>
+            <a:r>
+              <a:rPr kumimoji="1" lang="en-US" altLang="ja-JP" dirty="0" err="1"/>
+              <a:t>việt</a:t>
+            </a:r>
+            <a:r>
+              <a:rPr kumimoji="1" lang="en-US" altLang="ja-JP" dirty="0"/>
+              <a:t> </a:t>
+            </a:r>
+            <a:r>
+              <a:rPr kumimoji="1" lang="en-US" altLang="ja-JP" dirty="0" err="1"/>
+              <a:t>trên</a:t>
+            </a:r>
+            <a:r>
+              <a:rPr kumimoji="1" lang="en-US" altLang="ja-JP" dirty="0"/>
+              <a:t> chrome browser</a:t>
             </a:r>
           </a:p>
           <a:p>
             <a:pPr lvl="1"/>
             <a:r>
-              <a:rPr kumimoji="1" lang="en-US" altLang="ja-JP" dirty="0"/>
-              <a:t>React Js</a:t>
-            </a:r>
+              <a:rPr kumimoji="1" lang="en-US" altLang="ja-JP" dirty="0">
+                <a:hlinkClick r:id="rId2"/>
+              </a:rPr>
+              <a:t>https://chrome.google.com/webstore/detail/d%E1%BB%8Bch-anh-vi%E1%BB%87t-translate-e/jejemeonlhibjibgehcmdlldoebijolf?hl=vi</a:t>
+            </a:r>
+            <a:endParaRPr kumimoji="1" lang="en-US" altLang="ja-JP" dirty="0"/>
           </a:p>
           <a:p>
             <a:pPr lvl="1"/>
             <a:r>
-              <a:rPr kumimoji="1" lang="en-US" altLang="ja-JP" dirty="0"/>
-              <a:t>Vue JS</a:t>
+              <a:rPr lang="en-US" altLang="ja-JP" dirty="0"/>
+              <a:t>https://chrome.google.com/webstore/detail/select-to-translate-trans/hkbmajmmaeonfhjdcofabfilgfigpbao</a:t>
             </a:r>
           </a:p>
           <a:p>
             <a:pPr lvl="1"/>
-            <a:r>
-              <a:rPr lang="en-US" altLang="ja-JP" dirty="0"/>
-              <a:t>Angular</a:t>
-            </a:r>
-          </a:p>
-          <a:p>
-            <a:r>
-              <a:rPr kumimoji="1" lang="en-US" altLang="ja-JP" dirty="0" err="1"/>
-              <a:t>Tìm</a:t>
-            </a:r>
-            <a:r>
-              <a:rPr kumimoji="1" lang="en-US" altLang="ja-JP" dirty="0"/>
-              <a:t> </a:t>
-            </a:r>
-            <a:r>
-              <a:rPr kumimoji="1" lang="en-US" altLang="ja-JP" dirty="0" err="1"/>
-              <a:t>hiểu</a:t>
-            </a:r>
-            <a:r>
-              <a:rPr kumimoji="1" lang="en-US" altLang="ja-JP" dirty="0"/>
-              <a:t> </a:t>
-            </a:r>
-            <a:r>
-              <a:rPr kumimoji="1" lang="en-US" altLang="ja-JP" dirty="0" err="1"/>
-              <a:t>sauau</a:t>
-            </a:r>
-            <a:r>
-              <a:rPr kumimoji="1" lang="en-US" altLang="ja-JP" dirty="0"/>
-              <a:t> </a:t>
-            </a:r>
-            <a:r>
-              <a:rPr kumimoji="1" lang="en-US" altLang="ja-JP" dirty="0" err="1"/>
-              <a:t>thêm</a:t>
-            </a:r>
-            <a:r>
-              <a:rPr kumimoji="1" lang="en-US" altLang="ja-JP" dirty="0"/>
-              <a:t> </a:t>
-            </a:r>
-            <a:r>
-              <a:rPr kumimoji="1" lang="en-US" altLang="ja-JP" dirty="0" err="1"/>
-              <a:t>về</a:t>
-            </a:r>
-            <a:r>
-              <a:rPr kumimoji="1" lang="en-US" altLang="ja-JP" dirty="0"/>
-              <a:t> backend</a:t>
-            </a:r>
-          </a:p>
-          <a:p>
-            <a:pPr lvl="1"/>
-            <a:r>
-              <a:rPr kumimoji="1" lang="en-US" altLang="ja-JP" dirty="0" err="1"/>
-              <a:t>DataBase</a:t>
-            </a:r>
-            <a:endParaRPr kumimoji="1" lang="en-US" altLang="ja-JP" dirty="0"/>
-          </a:p>
-          <a:p>
-            <a:pPr lvl="1"/>
-            <a:r>
-              <a:rPr kumimoji="1" lang="en-US" altLang="ja-JP" dirty="0"/>
-              <a:t>Load </a:t>
-            </a:r>
-            <a:r>
-              <a:rPr kumimoji="1" lang="en-US" altLang="ja-JP" dirty="0" err="1"/>
-              <a:t>Blancing</a:t>
-            </a:r>
-            <a:endParaRPr kumimoji="1" lang="en-US" altLang="ja-JP" dirty="0"/>
-          </a:p>
-          <a:p>
-            <a:pPr lvl="1"/>
-            <a:r>
-              <a:rPr kumimoji="1" lang="en-US" altLang="ja-JP" dirty="0"/>
-              <a:t>Deploy server </a:t>
-            </a:r>
-          </a:p>
-          <a:p>
-            <a:pPr lvl="2"/>
-            <a:r>
-              <a:rPr kumimoji="1" lang="en-US" altLang="ja-JP" dirty="0"/>
-              <a:t>cloud  service (ex: AWS, digital ocean)</a:t>
-            </a:r>
-          </a:p>
-          <a:p>
-            <a:pPr lvl="2"/>
-            <a:r>
-              <a:rPr kumimoji="1" lang="en-US" altLang="ja-JP" dirty="0"/>
-              <a:t>Server Setup: </a:t>
-            </a:r>
-            <a:r>
-              <a:rPr kumimoji="1" lang="en-US" altLang="ja-JP" dirty="0" err="1"/>
-              <a:t>nginx</a:t>
-            </a:r>
-            <a:endParaRPr kumimoji="1" lang="en-US" altLang="ja-JP" dirty="0"/>
-          </a:p>
-          <a:p>
-            <a:pPr lvl="1"/>
-            <a:r>
-              <a:rPr lang="en-US" altLang="ja-JP" dirty="0"/>
-              <a:t>Security</a:t>
-            </a:r>
-          </a:p>
-          <a:p>
-            <a:pPr lvl="2"/>
-            <a:r>
-              <a:rPr kumimoji="1" lang="en-US" altLang="ja-JP" dirty="0" err="1"/>
-              <a:t>Mã</a:t>
-            </a:r>
-            <a:r>
-              <a:rPr kumimoji="1" lang="en-US" altLang="ja-JP" dirty="0"/>
-              <a:t> </a:t>
-            </a:r>
-            <a:r>
-              <a:rPr kumimoji="1" lang="en-US" altLang="ja-JP" dirty="0" err="1"/>
-              <a:t>hóa</a:t>
-            </a:r>
-            <a:endParaRPr kumimoji="1" lang="en-US" altLang="ja-JP" dirty="0"/>
+            <a:endParaRPr kumimoji="1" lang="ja-JP" altLang="en-US" dirty="0"/>
           </a:p>
         </p:txBody>
       </p:sp>
     </p:spTree>
     <p:extLst>
       <p:ext uri="{BB962C8B-B14F-4D97-AF65-F5344CB8AC3E}">
-        <p14:creationId xmlns:p14="http://schemas.microsoft.com/office/powerpoint/2010/main" val="3043749057"/>
+        <p14:creationId xmlns:p14="http://schemas.microsoft.com/office/powerpoint/2010/main" val="3730557784"/>
       </p:ext>
     </p:extLst>
   </p:cSld>
@@ -5218,6 +5104,279 @@
           <a:p>
             <a:r>
               <a:rPr lang="en-US" altLang="ja-JP" dirty="0" err="1"/>
+              <a:t>Bước</a:t>
+            </a:r>
+            <a:r>
+              <a:rPr lang="en-US" altLang="ja-JP" dirty="0"/>
+              <a:t> </a:t>
+            </a:r>
+            <a:r>
+              <a:rPr lang="en-US" altLang="ja-JP" dirty="0" err="1"/>
+              <a:t>tiếp</a:t>
+            </a:r>
+            <a:r>
+              <a:rPr lang="en-US" altLang="ja-JP" dirty="0"/>
+              <a:t> </a:t>
+            </a:r>
+            <a:r>
+              <a:rPr lang="en-US" altLang="ja-JP" dirty="0" err="1"/>
+              <a:t>theo</a:t>
+            </a:r>
+            <a:endParaRPr kumimoji="1" lang="ja-JP" altLang="en-US" dirty="0"/>
+          </a:p>
+        </p:txBody>
+      </p:sp>
+      <p:sp>
+        <p:nvSpPr>
+          <p:cNvPr id="3" name="コンテンツ プレースホルダー 2">
+            <a:extLst>
+              <a:ext uri="{FF2B5EF4-FFF2-40B4-BE49-F238E27FC236}">
+                <a16:creationId xmlns:a16="http://schemas.microsoft.com/office/drawing/2014/main" id="{6A807CC3-3A1B-4442-9583-1A6EB52FABFA}"/>
+              </a:ext>
+            </a:extLst>
+          </p:cNvPr>
+          <p:cNvSpPr>
+            <a:spLocks noGrp="1"/>
+          </p:cNvSpPr>
+          <p:nvPr>
+            <p:ph idx="1"/>
+          </p:nvPr>
+        </p:nvSpPr>
+        <p:spPr/>
+        <p:txBody>
+          <a:bodyPr>
+            <a:normAutofit lnSpcReduction="10000"/>
+          </a:bodyPr>
+          <a:lstStyle/>
+          <a:p>
+            <a:r>
+              <a:rPr kumimoji="1" lang="en-US" altLang="ja-JP" dirty="0" err="1"/>
+              <a:t>Tìm</a:t>
+            </a:r>
+            <a:r>
+              <a:rPr kumimoji="1" lang="en-US" altLang="ja-JP" dirty="0"/>
+              <a:t> </a:t>
+            </a:r>
+            <a:r>
+              <a:rPr lang="en-US" altLang="ja-JP" dirty="0" err="1"/>
+              <a:t>hiểu</a:t>
+            </a:r>
+            <a:r>
+              <a:rPr lang="en-US" altLang="ja-JP" dirty="0"/>
+              <a:t> </a:t>
+            </a:r>
+            <a:r>
+              <a:rPr lang="en-US" altLang="ja-JP" dirty="0" err="1"/>
+              <a:t>sâu</a:t>
+            </a:r>
+            <a:r>
+              <a:rPr lang="en-US" altLang="ja-JP" dirty="0"/>
+              <a:t> </a:t>
+            </a:r>
+            <a:r>
+              <a:rPr lang="en-US" altLang="ja-JP" dirty="0" err="1"/>
+              <a:t>thêm</a:t>
+            </a:r>
+            <a:r>
+              <a:rPr lang="en-US" altLang="ja-JP" dirty="0"/>
+              <a:t> </a:t>
+            </a:r>
+            <a:r>
+              <a:rPr lang="en-US" altLang="ja-JP" dirty="0" err="1"/>
+              <a:t>về</a:t>
+            </a:r>
+            <a:r>
+              <a:rPr lang="en-US" altLang="ja-JP" dirty="0"/>
+              <a:t> front end</a:t>
+            </a:r>
+          </a:p>
+          <a:p>
+            <a:pPr lvl="1"/>
+            <a:r>
+              <a:rPr kumimoji="1" lang="en-US" altLang="ja-JP" dirty="0"/>
+              <a:t>React Js</a:t>
+            </a:r>
+          </a:p>
+          <a:p>
+            <a:pPr lvl="1"/>
+            <a:r>
+              <a:rPr kumimoji="1" lang="en-US" altLang="ja-JP" dirty="0"/>
+              <a:t>Vue JS</a:t>
+            </a:r>
+          </a:p>
+          <a:p>
+            <a:pPr lvl="1"/>
+            <a:r>
+              <a:rPr lang="en-US" altLang="ja-JP" dirty="0"/>
+              <a:t>Angular</a:t>
+            </a:r>
+          </a:p>
+          <a:p>
+            <a:r>
+              <a:rPr kumimoji="1" lang="en-US" altLang="ja-JP" dirty="0" err="1"/>
+              <a:t>Tìm</a:t>
+            </a:r>
+            <a:r>
+              <a:rPr kumimoji="1" lang="en-US" altLang="ja-JP" dirty="0"/>
+              <a:t> </a:t>
+            </a:r>
+            <a:r>
+              <a:rPr kumimoji="1" lang="en-US" altLang="ja-JP" dirty="0" err="1"/>
+              <a:t>hiểu</a:t>
+            </a:r>
+            <a:r>
+              <a:rPr kumimoji="1" lang="en-US" altLang="ja-JP" dirty="0"/>
+              <a:t> </a:t>
+            </a:r>
+            <a:r>
+              <a:rPr kumimoji="1" lang="en-US" altLang="ja-JP" dirty="0" err="1"/>
+              <a:t>sauau</a:t>
+            </a:r>
+            <a:r>
+              <a:rPr kumimoji="1" lang="en-US" altLang="ja-JP" dirty="0"/>
+              <a:t> </a:t>
+            </a:r>
+            <a:r>
+              <a:rPr kumimoji="1" lang="en-US" altLang="ja-JP" dirty="0" err="1"/>
+              <a:t>thêm</a:t>
+            </a:r>
+            <a:r>
+              <a:rPr kumimoji="1" lang="en-US" altLang="ja-JP" dirty="0"/>
+              <a:t> </a:t>
+            </a:r>
+            <a:r>
+              <a:rPr kumimoji="1" lang="en-US" altLang="ja-JP" dirty="0" err="1"/>
+              <a:t>về</a:t>
+            </a:r>
+            <a:r>
+              <a:rPr kumimoji="1" lang="en-US" altLang="ja-JP" dirty="0"/>
+              <a:t> backend</a:t>
+            </a:r>
+          </a:p>
+          <a:p>
+            <a:pPr lvl="1"/>
+            <a:r>
+              <a:rPr kumimoji="1" lang="en-US" altLang="ja-JP" dirty="0" err="1"/>
+              <a:t>DataBase</a:t>
+            </a:r>
+            <a:endParaRPr kumimoji="1" lang="en-US" altLang="ja-JP" dirty="0"/>
+          </a:p>
+          <a:p>
+            <a:pPr lvl="1"/>
+            <a:r>
+              <a:rPr kumimoji="1" lang="en-US" altLang="ja-JP" dirty="0"/>
+              <a:t>Load </a:t>
+            </a:r>
+            <a:r>
+              <a:rPr kumimoji="1" lang="en-US" altLang="ja-JP" dirty="0" err="1"/>
+              <a:t>Blancing</a:t>
+            </a:r>
+            <a:endParaRPr kumimoji="1" lang="en-US" altLang="ja-JP" dirty="0"/>
+          </a:p>
+          <a:p>
+            <a:pPr lvl="1"/>
+            <a:r>
+              <a:rPr kumimoji="1" lang="en-US" altLang="ja-JP" dirty="0"/>
+              <a:t>Deploy server </a:t>
+            </a:r>
+          </a:p>
+          <a:p>
+            <a:pPr lvl="2"/>
+            <a:r>
+              <a:rPr kumimoji="1" lang="en-US" altLang="ja-JP" dirty="0"/>
+              <a:t>cloud  service (ex: AWS, digital ocean)</a:t>
+            </a:r>
+          </a:p>
+          <a:p>
+            <a:pPr lvl="2"/>
+            <a:r>
+              <a:rPr kumimoji="1" lang="en-US" altLang="ja-JP" dirty="0"/>
+              <a:t>Server Setup: </a:t>
+            </a:r>
+            <a:r>
+              <a:rPr kumimoji="1" lang="en-US" altLang="ja-JP" dirty="0" err="1"/>
+              <a:t>nginx</a:t>
+            </a:r>
+            <a:endParaRPr kumimoji="1" lang="en-US" altLang="ja-JP" dirty="0"/>
+          </a:p>
+          <a:p>
+            <a:pPr lvl="1"/>
+            <a:r>
+              <a:rPr lang="en-US" altLang="ja-JP" dirty="0"/>
+              <a:t>Security</a:t>
+            </a:r>
+          </a:p>
+          <a:p>
+            <a:pPr lvl="2"/>
+            <a:r>
+              <a:rPr kumimoji="1" lang="en-US" altLang="ja-JP" dirty="0" err="1"/>
+              <a:t>Mã</a:t>
+            </a:r>
+            <a:r>
+              <a:rPr kumimoji="1" lang="en-US" altLang="ja-JP" dirty="0"/>
+              <a:t> </a:t>
+            </a:r>
+            <a:r>
+              <a:rPr kumimoji="1" lang="en-US" altLang="ja-JP" dirty="0" err="1"/>
+              <a:t>hóa</a:t>
+            </a:r>
+            <a:endParaRPr kumimoji="1" lang="en-US" altLang="ja-JP" dirty="0"/>
+          </a:p>
+        </p:txBody>
+      </p:sp>
+    </p:spTree>
+    <p:extLst>
+      <p:ext uri="{BB962C8B-B14F-4D97-AF65-F5344CB8AC3E}">
+        <p14:creationId xmlns:p14="http://schemas.microsoft.com/office/powerpoint/2010/main" val="3043749057"/>
+      </p:ext>
+    </p:extLst>
+  </p:cSld>
+  <p:clrMapOvr>
+    <a:masterClrMapping/>
+  </p:clrMapOvr>
+</p:sld>
+</file>
+
+<file path=ppt/slides/slide7.xml><?xml version="1.0" encoding="utf-8"?>
+<p:sld xmlns:a="http://schemas.openxmlformats.org/drawingml/2006/main" xmlns:r="http://schemas.openxmlformats.org/officeDocument/2006/relationships" xmlns:p="http://schemas.openxmlformats.org/presentationml/2006/main">
+  <p:cSld>
+    <p:spTree>
+      <p:nvGrpSpPr>
+        <p:cNvPr id="1" name=""/>
+        <p:cNvGrpSpPr/>
+        <p:nvPr/>
+      </p:nvGrpSpPr>
+      <p:grpSpPr>
+        <a:xfrm>
+          <a:off x="0" y="0"/>
+          <a:ext cx="0" cy="0"/>
+          <a:chOff x="0" y="0"/>
+          <a:chExt cx="0" cy="0"/>
+        </a:xfrm>
+      </p:grpSpPr>
+      <p:sp>
+        <p:nvSpPr>
+          <p:cNvPr id="2" name="タイトル 1">
+            <a:extLst>
+              <a:ext uri="{FF2B5EF4-FFF2-40B4-BE49-F238E27FC236}">
+                <a16:creationId xmlns:a16="http://schemas.microsoft.com/office/drawing/2014/main" id="{3CE75281-3BCA-4351-AAEB-C979DEADA7D3}"/>
+              </a:ext>
+            </a:extLst>
+          </p:cNvPr>
+          <p:cNvSpPr>
+            <a:spLocks noGrp="1"/>
+          </p:cNvSpPr>
+          <p:nvPr>
+            <p:ph type="title"/>
+          </p:nvPr>
+        </p:nvSpPr>
+        <p:spPr/>
+        <p:txBody>
+          <a:bodyPr/>
+          <a:lstStyle/>
+          <a:p>
+            <a:r>
+              <a:rPr lang="en-US" altLang="ja-JP" dirty="0" err="1"/>
               <a:t>Các</a:t>
             </a:r>
             <a:r>
@@ -5475,7 +5634,7 @@
 </p:sld>
 </file>
 
-<file path=ppt/slides/slide7.xml><?xml version="1.0" encoding="utf-8"?>
+<file path=ppt/slides/slide8.xml><?xml version="1.0" encoding="utf-8"?>
 <p:sld xmlns:a="http://schemas.openxmlformats.org/drawingml/2006/main" xmlns:r="http://schemas.openxmlformats.org/officeDocument/2006/relationships" xmlns:p="http://schemas.openxmlformats.org/presentationml/2006/main">
   <p:cSld>
     <p:spTree>

</xml_diff>